<commit_message>
Adde lib folder and readme to gitignore file
</commit_message>
<xml_diff>
--- a/Demo-Pharmaplex.pptx
+++ b/Demo-Pharmaplex.pptx
@@ -259,7 +259,7 @@
           <a:p>
             <a:fld id="{BDB7646E-8811-423A-9C42-2CBFADA00A96}" type="datetimeFigureOut">
               <a:rPr lang="en-US" smtClean="0"/>
-              <a:t>7/2/2017</a:t>
+              <a:t>7/5/2017</a:t>
             </a:fld>
             <a:endParaRPr lang="en-US"/>
           </a:p>
@@ -433,7 +433,7 @@
             <a:fld id="{D677E230-58DD-43ED-96A1-552DDAB53532}" type="datetimeFigureOut">
               <a:rPr lang="en-US" smtClean="0"/>
               <a:pPr/>
-              <a:t>7/2/2017</a:t>
+              <a:t>7/5/2017</a:t>
             </a:fld>
             <a:endParaRPr lang="en-US"/>
           </a:p>
@@ -1452,7 +1452,7 @@
           <a:p>
             <a:fld id="{80BBE6BF-C811-45BB-8BA9-22EFF2B83FFA}" type="datetime1">
               <a:rPr lang="en-US" smtClean="0"/>
-              <a:t>7/2/2017</a:t>
+              <a:t>7/5/2017</a:t>
             </a:fld>
             <a:endParaRPr lang="en-US"/>
           </a:p>
@@ -1773,7 +1773,7 @@
           <a:p>
             <a:fld id="{42DF41C5-B5F2-469F-BA25-292CFCDAF6E0}" type="datetime1">
               <a:rPr lang="en-US" smtClean="0"/>
-              <a:t>7/2/2017</a:t>
+              <a:t>7/5/2017</a:t>
             </a:fld>
             <a:endParaRPr lang="en-US"/>
           </a:p>
@@ -1972,7 +1972,7 @@
           <a:p>
             <a:fld id="{E69D85FE-5443-4629-8A1C-6F6EA57CBD60}" type="datetime1">
               <a:rPr lang="en-US" smtClean="0"/>
-              <a:t>7/2/2017</a:t>
+              <a:t>7/5/2017</a:t>
             </a:fld>
             <a:endParaRPr lang="en-US"/>
           </a:p>
@@ -2271,7 +2271,7 @@
           <a:p>
             <a:fld id="{F39362CC-4597-4E8E-AFE5-237B3DA1FF07}" type="datetime1">
               <a:rPr lang="en-US" smtClean="0"/>
-              <a:t>7/2/2017</a:t>
+              <a:t>7/5/2017</a:t>
             </a:fld>
             <a:endParaRPr lang="en-US"/>
           </a:p>
@@ -2568,7 +2568,7 @@
           <a:p>
             <a:fld id="{E1F63988-78D4-46C4-B808-1786C6A42859}" type="datetime1">
               <a:rPr lang="en-US" smtClean="0"/>
-              <a:t>7/2/2017</a:t>
+              <a:t>7/5/2017</a:t>
             </a:fld>
             <a:endParaRPr lang="en-US"/>
           </a:p>
@@ -3029,7 +3029,7 @@
           <a:p>
             <a:fld id="{A482C1EE-CCC0-4F27-8918-BF938AC1419F}" type="datetime1">
               <a:rPr lang="en-US" smtClean="0"/>
-              <a:t>7/2/2017</a:t>
+              <a:t>7/5/2017</a:t>
             </a:fld>
             <a:endParaRPr lang="en-US"/>
           </a:p>
@@ -3564,7 +3564,7 @@
           <a:p>
             <a:fld id="{B9A0C48B-9D86-4C33-9BD3-2929B1D74E3D}" type="datetime1">
               <a:rPr lang="en-US" smtClean="0"/>
-              <a:t>7/2/2017</a:t>
+              <a:t>7/5/2017</a:t>
             </a:fld>
             <a:endParaRPr lang="en-US"/>
           </a:p>
@@ -3732,7 +3732,7 @@
           <a:p>
             <a:fld id="{E87B711C-F9D6-42CE-B848-D107B7756573}" type="datetime1">
               <a:rPr lang="en-US" smtClean="0"/>
-              <a:t>7/2/2017</a:t>
+              <a:t>7/5/2017</a:t>
             </a:fld>
             <a:endParaRPr lang="en-US"/>
           </a:p>
@@ -3864,7 +3864,7 @@
           <a:p>
             <a:fld id="{4C1EAC44-87EE-4E25-9BCB-D1B8F4FDD9D1}" type="datetime1">
               <a:rPr lang="en-US" smtClean="0"/>
-              <a:t>7/2/2017</a:t>
+              <a:t>7/5/2017</a:t>
             </a:fld>
             <a:endParaRPr lang="en-US"/>
           </a:p>
@@ -4210,7 +4210,7 @@
           <a:p>
             <a:fld id="{E68E44B9-3FFE-4574-9630-3E5A6F960186}" type="datetime1">
               <a:rPr lang="en-US" smtClean="0"/>
-              <a:t>7/2/2017</a:t>
+              <a:t>7/5/2017</a:t>
             </a:fld>
             <a:endParaRPr lang="en-US"/>
           </a:p>
@@ -4566,7 +4566,7 @@
           <a:p>
             <a:fld id="{F866F492-7803-4716-B969-A5873965FF8A}" type="datetime1">
               <a:rPr lang="en-US" smtClean="0"/>
-              <a:t>7/2/2017</a:t>
+              <a:t>7/5/2017</a:t>
             </a:fld>
             <a:endParaRPr lang="en-US"/>
           </a:p>
@@ -4858,7 +4858,7 @@
             <a:fld id="{FD004168-AADC-4457-9784-543656FEE4FC}" type="datetime1">
               <a:rPr lang="en-US" smtClean="0"/>
               <a:pPr/>
-              <a:t>7/2/2017</a:t>
+              <a:t>7/5/2017</a:t>
             </a:fld>
             <a:endParaRPr lang="en-US"/>
           </a:p>
@@ -5661,6 +5661,15 @@
               <a:t>Also provide alternate generic options.</a:t>
             </a:r>
           </a:p>
+          <a:p>
+            <a:pPr marL="0" lvl="0" indent="0">
+              <a:buNone/>
+            </a:pPr>
+            <a:endParaRPr lang="en-US" dirty="0">
+              <a:latin typeface="Dubai Medium" panose="020B0603030403030204" pitchFamily="34" charset="-78"/>
+              <a:cs typeface="Dubai Medium" panose="020B0603030403030204" pitchFamily="34" charset="-78"/>
+            </a:endParaRPr>
+          </a:p>
         </p:txBody>
       </p:sp>
     </p:spTree>
@@ -5835,11 +5844,18 @@
           <a:p>
             <a:pPr lvl="0"/>
             <a:r>
+              <a:rPr lang="en-US">
+                <a:latin typeface="Dubai Medium" panose="020B0603030403030204" pitchFamily="34" charset="-78"/>
+                <a:cs typeface="Dubai Medium" panose="020B0603030403030204" pitchFamily="34" charset="-78"/>
+              </a:rPr>
+              <a:t>Called </a:t>
+            </a:r>
+            <a:r>
               <a:rPr lang="en-US" dirty="0">
                 <a:latin typeface="Dubai Medium" panose="020B0603030403030204" pitchFamily="34" charset="-78"/>
                 <a:cs typeface="Dubai Medium" panose="020B0603030403030204" pitchFamily="34" charset="-78"/>
               </a:rPr>
-              <a:t>Called REST API &amp; parse JSON response to display the result on DOM.</a:t>
+              <a:t>API &amp; parse JSON response to display the result on DOM.</a:t>
             </a:r>
             <a:br>
               <a:rPr lang="en-US" dirty="0">
@@ -6008,13 +6024,13 @@
         </p:nvSpPr>
         <p:spPr>
           <a:xfrm>
-            <a:off x="7466012" y="5912749"/>
-            <a:ext cx="4503943" cy="912885"/>
+            <a:off x="6780212" y="6019800"/>
+            <a:ext cx="5189743" cy="805834"/>
           </a:xfrm>
         </p:spPr>
         <p:txBody>
           <a:bodyPr>
-            <a:normAutofit/>
+            <a:normAutofit fontScale="92500" lnSpcReduction="10000"/>
           </a:bodyPr>
           <a:lstStyle/>
           <a:p>
@@ -6048,6 +6064,26 @@
               <a:rPr lang="en-US" sz="2000" dirty="0"/>
               <a:t> </a:t>
             </a:r>
+          </a:p>
+          <a:p>
+            <a:r>
+              <a:rPr lang="en-US" sz="2100" dirty="0"/>
+              <a:t>Website</a:t>
+            </a:r>
+            <a:r>
+              <a:rPr lang="en-US" sz="1400" dirty="0"/>
+              <a:t>: </a:t>
+            </a:r>
+            <a:r>
+              <a:rPr lang="en-US" sz="2000" dirty="0">
+                <a:hlinkClick r:id="rId5"/>
+              </a:rPr>
+              <a:t>https://preetikrp.github.io/Mywebsite/</a:t>
+            </a:r>
+            <a:endParaRPr lang="en-US" sz="1400" dirty="0"/>
+          </a:p>
+          <a:p>
+            <a:endParaRPr lang="en-US" sz="2000" dirty="0"/>
           </a:p>
         </p:txBody>
       </p:sp>
@@ -6135,13 +6171,13 @@
         </p:nvSpPr>
         <p:spPr>
           <a:xfrm>
-            <a:off x="7466012" y="5912749"/>
-            <a:ext cx="4503943" cy="912885"/>
+            <a:off x="6475412" y="6019801"/>
+            <a:ext cx="5494543" cy="805834"/>
           </a:xfrm>
         </p:spPr>
         <p:txBody>
           <a:bodyPr>
-            <a:normAutofit/>
+            <a:normAutofit fontScale="92500" lnSpcReduction="10000"/>
           </a:bodyPr>
           <a:lstStyle/>
           <a:p>
@@ -6175,6 +6211,338 @@
               <a:rPr lang="en-US" sz="2000" dirty="0"/>
               <a:t> </a:t>
             </a:r>
+          </a:p>
+          <a:p>
+            <a:r>
+              <a:rPr lang="en-US" sz="2100" dirty="0"/>
+              <a:t>Website</a:t>
+            </a:r>
+            <a:r>
+              <a:rPr lang="en-US" sz="1400" dirty="0"/>
+              <a:t>: </a:t>
+            </a:r>
+            <a:r>
+              <a:rPr lang="en-US" sz="2000" dirty="0">
+                <a:hlinkClick r:id="rId5"/>
+              </a:rPr>
+              <a:t>https://preetikrp.github.io/Mywebsite/</a:t>
+            </a:r>
+            <a:endParaRPr lang="en-US" sz="1400" dirty="0"/>
+          </a:p>
+          <a:p>
+            <a:endParaRPr lang="en-US" sz="2000" dirty="0"/>
+          </a:p>
+        </p:txBody>
+      </p:sp>
+      <p:sp>
+        <p:nvSpPr>
+          <p:cNvPr id="4" name="Rectangle 1">
+            <a:extLst>
+              <a:ext uri="{FF2B5EF4-FFF2-40B4-BE49-F238E27FC236}">
+                <a16:creationId xmlns:a16="http://schemas.microsoft.com/office/drawing/2014/main" id="{62A6A05F-A157-4FC9-B45A-680F347A953D}"/>
+              </a:ext>
+            </a:extLst>
+          </p:cNvPr>
+          <p:cNvSpPr>
+            <a:spLocks noChangeArrowheads="1"/>
+          </p:cNvSpPr>
+          <p:nvPr/>
+        </p:nvSpPr>
+        <p:spPr bwMode="auto">
+          <a:xfrm>
+            <a:off x="0" y="0"/>
+            <a:ext cx="12188825" cy="0"/>
+          </a:xfrm>
+          <a:prstGeom prst="rect">
+            <a:avLst/>
+          </a:prstGeom>
+          <a:solidFill>
+            <a:srgbClr val="DCFFE4"/>
+          </a:solidFill>
+          <a:ln>
+            <a:noFill/>
+          </a:ln>
+          <a:effectLst/>
+          <a:extLst>
+            <a:ext uri="{91240B29-F687-4F45-9708-019B960494DF}">
+              <a14:hiddenLine xmlns:a14="http://schemas.microsoft.com/office/drawing/2010/main" w="9525">
+                <a:solidFill>
+                  <a:schemeClr val="tx1"/>
+                </a:solidFill>
+                <a:miter lim="800000"/>
+                <a:headEnd/>
+                <a:tailEnd/>
+              </a14:hiddenLine>
+            </a:ext>
+            <a:ext uri="{AF507438-7753-43E0-B8FC-AC1667EBCBE1}">
+              <a14:hiddenEffects xmlns:a14="http://schemas.microsoft.com/office/drawing/2010/main">
+                <a:effectLst>
+                  <a:outerShdw dist="35921" dir="2700000" algn="ctr" rotWithShape="0">
+                    <a:schemeClr val="bg2"/>
+                  </a:outerShdw>
+                </a:effectLst>
+              </a14:hiddenEffects>
+            </a:ext>
+          </a:extLst>
+        </p:spPr>
+        <p:txBody>
+          <a:bodyPr vert="horz" wrap="none" lIns="0" tIns="-9522" rIns="0" bIns="0" numCol="1" anchor="ctr" anchorCtr="0" compatLnSpc="1">
+            <a:prstTxWarp prst="textNoShape">
+              <a:avLst/>
+            </a:prstTxWarp>
+            <a:spAutoFit/>
+          </a:bodyPr>
+          <a:lstStyle/>
+          <a:p>
+            <a:pPr marL="0" marR="0" lvl="0" indent="0" algn="l" defTabSz="914400" rtl="0" eaLnBrk="0" fontAlgn="base" latinLnBrk="0" hangingPunct="0">
+              <a:lnSpc>
+                <a:spcPct val="100000"/>
+              </a:lnSpc>
+              <a:spcBef>
+                <a:spcPct val="0"/>
+              </a:spcBef>
+              <a:spcAft>
+                <a:spcPct val="0"/>
+              </a:spcAft>
+              <a:buClrTx/>
+              <a:buSzTx/>
+              <a:buFontTx/>
+              <a:buNone/>
+              <a:tabLst/>
+            </a:pPr>
+            <a:r>
+              <a:rPr kumimoji="0" lang="en-US" altLang="en-US" sz="1000" b="0" i="0" u="none" strike="noStrike" cap="none" normalizeH="0" baseline="0">
+                <a:ln>
+                  <a:noFill/>
+                </a:ln>
+                <a:solidFill>
+                  <a:srgbClr val="165C26"/>
+                </a:solidFill>
+                <a:effectLst/>
+                <a:latin typeface="-apple-system"/>
+              </a:rPr>
+              <a:t> Your site is published at </a:t>
+            </a:r>
+            <a:r>
+              <a:rPr kumimoji="0" lang="en-US" altLang="en-US" sz="1000" b="0" i="0" u="none" strike="noStrike" cap="none" normalizeH="0" baseline="0">
+                <a:ln>
+                  <a:noFill/>
+                </a:ln>
+                <a:solidFill>
+                  <a:srgbClr val="0366D6"/>
+                </a:solidFill>
+                <a:effectLst/>
+                <a:latin typeface="-apple-system"/>
+                <a:hlinkClick r:id="rId5"/>
+              </a:rPr>
+              <a:t>https://preetikrp.github.io/Mywebsite/</a:t>
+            </a:r>
+            <a:endParaRPr kumimoji="0" lang="en-US" altLang="en-US" sz="1000" b="0" i="0" u="none" strike="noStrike" cap="none" normalizeH="0" baseline="0">
+              <a:ln>
+                <a:noFill/>
+              </a:ln>
+              <a:solidFill>
+                <a:srgbClr val="24292E"/>
+              </a:solidFill>
+              <a:effectLst/>
+              <a:latin typeface="-apple-system"/>
+            </a:endParaRPr>
+          </a:p>
+          <a:p>
+            <a:pPr marL="0" marR="0" lvl="0" indent="0" algn="l" defTabSz="914400" rtl="0" eaLnBrk="0" fontAlgn="base" latinLnBrk="0" hangingPunct="0">
+              <a:lnSpc>
+                <a:spcPct val="100000"/>
+              </a:lnSpc>
+              <a:spcBef>
+                <a:spcPct val="0"/>
+              </a:spcBef>
+              <a:spcAft>
+                <a:spcPct val="0"/>
+              </a:spcAft>
+              <a:buClrTx/>
+              <a:buSzTx/>
+              <a:buFontTx/>
+              <a:buChar char="•"/>
+              <a:tabLst/>
+            </a:pPr>
+            <a:br>
+              <a:rPr kumimoji="0" lang="en-US" altLang="en-US" sz="1000" b="0" i="0" u="none" strike="noStrike" cap="none" normalizeH="0" baseline="0">
+                <a:ln>
+                  <a:noFill/>
+                </a:ln>
+                <a:solidFill>
+                  <a:srgbClr val="24292E"/>
+                </a:solidFill>
+                <a:effectLst/>
+                <a:latin typeface="-apple-system"/>
+              </a:rPr>
+            </a:br>
+            <a:endParaRPr kumimoji="0" lang="en-US" altLang="en-US" sz="1800" b="0" i="0" u="none" strike="noStrike" cap="none" normalizeH="0" baseline="0">
+              <a:ln>
+                <a:noFill/>
+              </a:ln>
+              <a:solidFill>
+                <a:schemeClr val="tx1"/>
+              </a:solidFill>
+              <a:effectLst/>
+              <a:latin typeface="Arial" panose="020B0604020202020204" pitchFamily="34" charset="0"/>
+            </a:endParaRPr>
+          </a:p>
+        </p:txBody>
+      </p:sp>
+      <p:sp>
+        <p:nvSpPr>
+          <p:cNvPr id="5" name="Rectangle 2">
+            <a:extLst>
+              <a:ext uri="{FF2B5EF4-FFF2-40B4-BE49-F238E27FC236}">
+                <a16:creationId xmlns:a16="http://schemas.microsoft.com/office/drawing/2014/main" id="{4F2172CA-A75E-4BB8-BE0D-E303DC0758C6}"/>
+              </a:ext>
+            </a:extLst>
+          </p:cNvPr>
+          <p:cNvSpPr>
+            <a:spLocks noChangeArrowheads="1"/>
+          </p:cNvSpPr>
+          <p:nvPr/>
+        </p:nvSpPr>
+        <p:spPr bwMode="auto">
+          <a:xfrm>
+            <a:off x="152400" y="152400"/>
+            <a:ext cx="12188825" cy="0"/>
+          </a:xfrm>
+          <a:prstGeom prst="rect">
+            <a:avLst/>
+          </a:prstGeom>
+          <a:solidFill>
+            <a:srgbClr val="DCFFE4"/>
+          </a:solidFill>
+          <a:ln>
+            <a:noFill/>
+          </a:ln>
+          <a:effectLst/>
+          <a:extLst>
+            <a:ext uri="{91240B29-F687-4F45-9708-019B960494DF}">
+              <a14:hiddenLine xmlns:a14="http://schemas.microsoft.com/office/drawing/2010/main" w="9525">
+                <a:solidFill>
+                  <a:schemeClr val="tx1"/>
+                </a:solidFill>
+                <a:miter lim="800000"/>
+                <a:headEnd/>
+                <a:tailEnd/>
+              </a14:hiddenLine>
+            </a:ext>
+            <a:ext uri="{AF507438-7753-43E0-B8FC-AC1667EBCBE1}">
+              <a14:hiddenEffects xmlns:a14="http://schemas.microsoft.com/office/drawing/2010/main">
+                <a:effectLst>
+                  <a:outerShdw dist="35921" dir="2700000" algn="ctr" rotWithShape="0">
+                    <a:schemeClr val="bg2"/>
+                  </a:outerShdw>
+                </a:effectLst>
+              </a14:hiddenEffects>
+            </a:ext>
+          </a:extLst>
+        </p:spPr>
+        <p:txBody>
+          <a:bodyPr vert="horz" wrap="none" lIns="0" tIns="-9522" rIns="0" bIns="0" numCol="1" anchor="ctr" anchorCtr="0" compatLnSpc="1">
+            <a:prstTxWarp prst="textNoShape">
+              <a:avLst/>
+            </a:prstTxWarp>
+            <a:spAutoFit/>
+          </a:bodyPr>
+          <a:lstStyle/>
+          <a:p>
+            <a:pPr marL="0" marR="0" lvl="0" indent="0" algn="l" defTabSz="914400" rtl="0" eaLnBrk="0" fontAlgn="base" latinLnBrk="0" hangingPunct="0">
+              <a:lnSpc>
+                <a:spcPct val="100000"/>
+              </a:lnSpc>
+              <a:spcBef>
+                <a:spcPct val="0"/>
+              </a:spcBef>
+              <a:spcAft>
+                <a:spcPct val="0"/>
+              </a:spcAft>
+              <a:buClrTx/>
+              <a:buSzTx/>
+              <a:buFontTx/>
+              <a:buNone/>
+              <a:tabLst/>
+            </a:pPr>
+            <a:r>
+              <a:rPr kumimoji="0" lang="en-US" altLang="en-US" sz="1000" b="0" i="0" u="none" strike="noStrike" cap="none" normalizeH="0" baseline="0">
+                <a:ln>
+                  <a:noFill/>
+                </a:ln>
+                <a:solidFill>
+                  <a:srgbClr val="165C26"/>
+                </a:solidFill>
+                <a:effectLst/>
+                <a:latin typeface="-apple-system"/>
+              </a:rPr>
+              <a:t> Your site is published at </a:t>
+            </a:r>
+            <a:r>
+              <a:rPr kumimoji="0" lang="en-US" altLang="en-US" sz="1000" b="0" i="0" u="none" strike="noStrike" cap="none" normalizeH="0" baseline="0">
+                <a:ln>
+                  <a:noFill/>
+                </a:ln>
+                <a:solidFill>
+                  <a:srgbClr val="0366D6"/>
+                </a:solidFill>
+                <a:effectLst/>
+                <a:latin typeface="-apple-system"/>
+                <a:hlinkClick r:id="rId5"/>
+              </a:rPr>
+              <a:t>https://preetikrp.github.io/Mywebsite/</a:t>
+            </a:r>
+            <a:endParaRPr kumimoji="0" lang="en-US" altLang="en-US" sz="1000" b="0" i="0" u="none" strike="noStrike" cap="none" normalizeH="0" baseline="0">
+              <a:ln>
+                <a:noFill/>
+              </a:ln>
+              <a:solidFill>
+                <a:srgbClr val="24292E"/>
+              </a:solidFill>
+              <a:effectLst/>
+              <a:latin typeface="-apple-system"/>
+            </a:endParaRPr>
+          </a:p>
+          <a:p>
+            <a:pPr marL="0" marR="0" lvl="0" indent="0" algn="l" defTabSz="914400" rtl="0" eaLnBrk="0" fontAlgn="base" latinLnBrk="0" hangingPunct="0">
+              <a:lnSpc>
+                <a:spcPct val="100000"/>
+              </a:lnSpc>
+              <a:spcBef>
+                <a:spcPct val="0"/>
+              </a:spcBef>
+              <a:spcAft>
+                <a:spcPct val="0"/>
+              </a:spcAft>
+              <a:buClrTx/>
+              <a:buSzTx/>
+              <a:buFontTx/>
+              <a:buChar char="•"/>
+              <a:tabLst/>
+            </a:pPr>
+            <a:br>
+              <a:rPr kumimoji="0" lang="en-US" altLang="en-US" sz="1000" b="0" i="0" u="none" strike="noStrike" cap="none" normalizeH="0" baseline="0">
+                <a:ln>
+                  <a:noFill/>
+                </a:ln>
+                <a:solidFill>
+                  <a:srgbClr val="24292E"/>
+                </a:solidFill>
+                <a:effectLst/>
+                <a:latin typeface="-apple-system"/>
+              </a:rPr>
+            </a:br>
+            <a:endParaRPr kumimoji="0" lang="en-US" altLang="en-US" sz="1800" b="0" i="0" u="none" strike="noStrike" cap="none" normalizeH="0" baseline="0">
+              <a:ln>
+                <a:noFill/>
+              </a:ln>
+              <a:solidFill>
+                <a:schemeClr val="tx1"/>
+              </a:solidFill>
+              <a:effectLst/>
+              <a:latin typeface="Arial" panose="020B0604020202020204" pitchFamily="34" charset="0"/>
+            </a:endParaRPr>
           </a:p>
         </p:txBody>
       </p:sp>

</xml_diff>